<commit_message>
Swap Nodes in Pairs
</commit_message>
<xml_diff>
--- a/算法推导图.pptx
+++ b/算法推导图.pptx
@@ -5,7 +5,7 @@
     <p:sldMasterId id="2147483648" r:id="rId1"/>
   </p:sldMasterIdLst>
   <p:notesMasterIdLst>
-    <p:notesMasterId r:id="rId21"/>
+    <p:notesMasterId r:id="rId22"/>
   </p:notesMasterIdLst>
   <p:sldIdLst>
     <p:sldId id="256" r:id="rId2"/>
@@ -27,6 +27,7 @@
     <p:sldId id="285" r:id="rId18"/>
     <p:sldId id="286" r:id="rId19"/>
     <p:sldId id="288" r:id="rId20"/>
+    <p:sldId id="289" r:id="rId21"/>
   </p:sldIdLst>
   <p:sldSz cx="12192000" cy="6858000"/>
   <p:notesSz cx="6858000" cy="9144000"/>
@@ -215,7 +216,7 @@
           <a:p>
             <a:fld id="{3EFD42F7-718C-4B98-AAEC-167E6DDD60A7}" type="datetimeFigureOut">
               <a:rPr lang="en-US" smtClean="0"/>
-              <a:t>3/4/2024</a:t>
+              <a:t>3/7/2024</a:t>
             </a:fld>
             <a:endParaRPr lang="en-US"/>
           </a:p>
@@ -606,7 +607,7 @@
           <a:p>
             <a:fld id="{63A1C593-65D0-4073-BCC9-577B9352EA97}" type="datetime1">
               <a:rPr lang="en-US" smtClean="0"/>
-              <a:t>3/4/2024</a:t>
+              <a:t>3/7/2024</a:t>
             </a:fld>
             <a:endParaRPr lang="en-US"/>
           </a:p>
@@ -770,7 +771,7 @@
           <a:p>
             <a:fld id="{63A1C593-65D0-4073-BCC9-577B9352EA97}" type="datetime1">
               <a:rPr lang="en-US" smtClean="0"/>
-              <a:t>3/4/2024</a:t>
+              <a:t>3/7/2024</a:t>
             </a:fld>
             <a:endParaRPr lang="en-US"/>
           </a:p>
@@ -944,7 +945,7 @@
           <a:p>
             <a:fld id="{63A1C593-65D0-4073-BCC9-577B9352EA97}" type="datetime1">
               <a:rPr lang="en-US" smtClean="0"/>
-              <a:t>3/4/2024</a:t>
+              <a:t>3/7/2024</a:t>
             </a:fld>
             <a:endParaRPr lang="en-US"/>
           </a:p>
@@ -1108,7 +1109,7 @@
           <a:p>
             <a:fld id="{63A1C593-65D0-4073-BCC9-577B9352EA97}" type="datetime1">
               <a:rPr lang="en-US" smtClean="0"/>
-              <a:t>3/4/2024</a:t>
+              <a:t>3/7/2024</a:t>
             </a:fld>
             <a:endParaRPr lang="en-US"/>
           </a:p>
@@ -1349,7 +1350,7 @@
           <a:p>
             <a:fld id="{63A1C593-65D0-4073-BCC9-577B9352EA97}" type="datetime1">
               <a:rPr lang="en-US" smtClean="0"/>
-              <a:t>3/4/2024</a:t>
+              <a:t>3/7/2024</a:t>
             </a:fld>
             <a:endParaRPr lang="en-US"/>
           </a:p>
@@ -1574,7 +1575,7 @@
           <a:p>
             <a:fld id="{63A1C593-65D0-4073-BCC9-577B9352EA97}" type="datetime1">
               <a:rPr lang="en-US" smtClean="0"/>
-              <a:t>3/4/2024</a:t>
+              <a:t>3/7/2024</a:t>
             </a:fld>
             <a:endParaRPr lang="en-US"/>
           </a:p>
@@ -1934,7 +1935,7 @@
           <a:p>
             <a:fld id="{63A1C593-65D0-4073-BCC9-577B9352EA97}" type="datetime1">
               <a:rPr lang="en-US" smtClean="0"/>
-              <a:t>3/4/2024</a:t>
+              <a:t>3/7/2024</a:t>
             </a:fld>
             <a:endParaRPr lang="en-US"/>
           </a:p>
@@ -2047,7 +2048,7 @@
           <a:p>
             <a:fld id="{63A1C593-65D0-4073-BCC9-577B9352EA97}" type="datetime1">
               <a:rPr lang="en-US" smtClean="0"/>
-              <a:t>3/4/2024</a:t>
+              <a:t>3/7/2024</a:t>
             </a:fld>
             <a:endParaRPr lang="en-US"/>
           </a:p>
@@ -2138,7 +2139,7 @@
           <a:p>
             <a:fld id="{63A1C593-65D0-4073-BCC9-577B9352EA97}" type="datetime1">
               <a:rPr lang="en-US" smtClean="0"/>
-              <a:t>3/4/2024</a:t>
+              <a:t>3/7/2024</a:t>
             </a:fld>
             <a:endParaRPr lang="en-US"/>
           </a:p>
@@ -2409,7 +2410,7 @@
           <a:p>
             <a:fld id="{63A1C593-65D0-4073-BCC9-577B9352EA97}" type="datetime1">
               <a:rPr lang="en-US" smtClean="0"/>
-              <a:t>3/4/2024</a:t>
+              <a:t>3/7/2024</a:t>
             </a:fld>
             <a:endParaRPr lang="en-US"/>
           </a:p>
@@ -2657,7 +2658,7 @@
           <a:p>
             <a:fld id="{63A1C593-65D0-4073-BCC9-577B9352EA97}" type="datetime1">
               <a:rPr lang="en-US" smtClean="0"/>
-              <a:t>3/4/2024</a:t>
+              <a:t>3/7/2024</a:t>
             </a:fld>
             <a:endParaRPr lang="en-US"/>
           </a:p>
@@ -2864,7 +2865,7 @@
           <a:p>
             <a:fld id="{63A1C593-65D0-4073-BCC9-577B9352EA97}" type="datetime1">
               <a:rPr lang="en-US" smtClean="0"/>
-              <a:t>3/4/2024</a:t>
+              <a:t>3/7/2024</a:t>
             </a:fld>
             <a:endParaRPr lang="en-US"/>
           </a:p>
@@ -41970,6 +41971,2384 @@
         </p:style>
       </p:cxnSp>
     </p:spTree>
+  </p:cSld>
+  <p:clrMapOvr>
+    <a:masterClrMapping/>
+  </p:clrMapOvr>
+</p:sld>
+</file>
+
+<file path=ppt/slides/slide20.xml><?xml version="1.0" encoding="utf-8"?>
+<p:sld xmlns:a="http://schemas.openxmlformats.org/drawingml/2006/main" xmlns:r="http://schemas.openxmlformats.org/officeDocument/2006/relationships" xmlns:p="http://schemas.openxmlformats.org/presentationml/2006/main">
+  <p:cSld>
+    <p:spTree>
+      <p:nvGrpSpPr>
+        <p:cNvPr id="1" name="">
+          <a:extLst>
+            <a:ext uri="{FF2B5EF4-FFF2-40B4-BE49-F238E27FC236}">
+              <a16:creationId xmlns:a16="http://schemas.microsoft.com/office/drawing/2014/main" id="{FFDA9427-A0C9-BFB5-9BB8-D9FCA4E9BCA9}"/>
+            </a:ext>
+          </a:extLst>
+        </p:cNvPr>
+        <p:cNvGrpSpPr/>
+        <p:nvPr/>
+      </p:nvGrpSpPr>
+      <p:grpSpPr>
+        <a:xfrm>
+          <a:off x="0" y="0"/>
+          <a:ext cx="0" cy="0"/>
+          <a:chOff x="0" y="0"/>
+          <a:chExt cx="0" cy="0"/>
+        </a:xfrm>
+      </p:grpSpPr>
+      <p:sp>
+        <p:nvSpPr>
+          <p:cNvPr id="4" name="页脚占位符 3">
+            <a:extLst>
+              <a:ext uri="{FF2B5EF4-FFF2-40B4-BE49-F238E27FC236}">
+                <a16:creationId xmlns:a16="http://schemas.microsoft.com/office/drawing/2014/main" id="{F185B60E-C0F1-2C6E-D2C1-198B510D86D0}"/>
+              </a:ext>
+            </a:extLst>
+          </p:cNvPr>
+          <p:cNvSpPr>
+            <a:spLocks noGrp="1"/>
+          </p:cNvSpPr>
+          <p:nvPr>
+            <p:ph type="ftr" sz="quarter" idx="11"/>
+          </p:nvPr>
+        </p:nvSpPr>
+        <p:spPr>
+          <a:xfrm>
+            <a:off x="4088991" y="6381517"/>
+            <a:ext cx="4114800" cy="365125"/>
+          </a:xfrm>
+        </p:spPr>
+        <p:txBody>
+          <a:bodyPr/>
+          <a:lstStyle/>
+          <a:p>
+            <a:r>
+              <a:rPr lang="en-US" altLang="en-US" dirty="0"/>
+              <a:t>17.</a:t>
+            </a:r>
+            <a:r>
+              <a:rPr lang="en-US" altLang="zh-CN" dirty="0"/>
+              <a:t>Swap Nodes in Pairs</a:t>
+            </a:r>
+          </a:p>
+        </p:txBody>
+      </p:sp>
+      <p:sp>
+        <p:nvSpPr>
+          <p:cNvPr id="19" name="Text Box 18">
+            <a:extLst>
+              <a:ext uri="{FF2B5EF4-FFF2-40B4-BE49-F238E27FC236}">
+                <a16:creationId xmlns:a16="http://schemas.microsoft.com/office/drawing/2014/main" id="{143A3F1F-46EA-ADBC-2DAD-0ADF774081B2}"/>
+              </a:ext>
+            </a:extLst>
+          </p:cNvPr>
+          <p:cNvSpPr txBox="1"/>
+          <p:nvPr/>
+        </p:nvSpPr>
+        <p:spPr>
+          <a:xfrm>
+            <a:off x="1470573" y="111358"/>
+            <a:ext cx="4675818" cy="369332"/>
+          </a:xfrm>
+          <a:prstGeom prst="rect">
+            <a:avLst/>
+          </a:prstGeom>
+          <a:noFill/>
+        </p:spPr>
+        <p:txBody>
+          <a:bodyPr wrap="square" rtlCol="0" anchor="t">
+            <a:spAutoFit/>
+          </a:bodyPr>
+          <a:lstStyle/>
+          <a:p>
+            <a:r>
+              <a:rPr lang="en-US" altLang="zh-CN" b="1" dirty="0">
+                <a:ea typeface="微软雅黑" panose="020B0503020204020204" charset="-122"/>
+                <a:cs typeface="Calibri" panose="020F0502020204030204" charset="0"/>
+              </a:rPr>
+              <a:t>head = [1,2,3,4,5], </a:t>
+            </a:r>
+            <a:r>
+              <a:rPr lang="en-US" altLang="zh-CN" b="1" dirty="0">
+                <a:solidFill>
+                  <a:schemeClr val="accent6"/>
+                </a:solidFill>
+                <a:ea typeface="微软雅黑" panose="020B0503020204020204" charset="-122"/>
+                <a:cs typeface="Calibri" panose="020F0502020204030204" charset="0"/>
+              </a:rPr>
+              <a:t>cur</a:t>
+            </a:r>
+            <a:r>
+              <a:rPr lang="en-US" altLang="zh-CN" b="1" dirty="0">
+                <a:ea typeface="微软雅黑" panose="020B0503020204020204" charset="-122"/>
+                <a:cs typeface="Calibri" panose="020F0502020204030204" charset="0"/>
+              </a:rPr>
+              <a:t>: traverse the nodes </a:t>
+            </a:r>
+          </a:p>
+        </p:txBody>
+      </p:sp>
+      <p:sp>
+        <p:nvSpPr>
+          <p:cNvPr id="62" name="Rectangles 4">
+            <a:extLst>
+              <a:ext uri="{FF2B5EF4-FFF2-40B4-BE49-F238E27FC236}">
+                <a16:creationId xmlns:a16="http://schemas.microsoft.com/office/drawing/2014/main" id="{49986391-FB6F-7112-BD5E-01B734BF73FF}"/>
+              </a:ext>
+            </a:extLst>
+          </p:cNvPr>
+          <p:cNvSpPr/>
+          <p:nvPr/>
+        </p:nvSpPr>
+        <p:spPr>
+          <a:xfrm>
+            <a:off x="1579539" y="664237"/>
+            <a:ext cx="356870" cy="375285"/>
+          </a:xfrm>
+          <a:prstGeom prst="rect">
+            <a:avLst/>
+          </a:prstGeom>
+          <a:solidFill>
+            <a:schemeClr val="accent6">
+              <a:lumMod val="60000"/>
+              <a:lumOff val="40000"/>
+            </a:schemeClr>
+          </a:solidFill>
+          <a:ln w="19050">
+            <a:solidFill>
+              <a:schemeClr val="tx1">
+                <a:lumMod val="65000"/>
+                <a:lumOff val="35000"/>
+              </a:schemeClr>
+            </a:solidFill>
+          </a:ln>
+        </p:spPr>
+        <p:style>
+          <a:lnRef idx="2">
+            <a:schemeClr val="accent1">
+              <a:lumMod val="75000"/>
+            </a:schemeClr>
+          </a:lnRef>
+          <a:fillRef idx="1">
+            <a:schemeClr val="accent1"/>
+          </a:fillRef>
+          <a:effectRef idx="0">
+            <a:srgbClr val="FFFFFF"/>
+          </a:effectRef>
+          <a:fontRef idx="minor">
+            <a:schemeClr val="lt1"/>
+          </a:fontRef>
+        </p:style>
+        <p:txBody>
+          <a:bodyPr rtlCol="0" anchor="ctr"/>
+          <a:lstStyle/>
+          <a:p>
+            <a:pPr algn="ctr"/>
+            <a:r>
+              <a:rPr lang="en-US" b="1" dirty="0">
+                <a:solidFill>
+                  <a:schemeClr val="tx1"/>
+                </a:solidFill>
+                <a:latin typeface="Calibri" panose="020F0502020204030204" charset="0"/>
+                <a:cs typeface="Calibri" panose="020F0502020204030204" charset="0"/>
+              </a:rPr>
+              <a:t>1</a:t>
+            </a:r>
+          </a:p>
+        </p:txBody>
+      </p:sp>
+      <p:sp>
+        <p:nvSpPr>
+          <p:cNvPr id="217" name="Rectangles 4">
+            <a:extLst>
+              <a:ext uri="{FF2B5EF4-FFF2-40B4-BE49-F238E27FC236}">
+                <a16:creationId xmlns:a16="http://schemas.microsoft.com/office/drawing/2014/main" id="{69A49FB2-3A1A-902C-BF66-12CFDB70CE51}"/>
+              </a:ext>
+            </a:extLst>
+          </p:cNvPr>
+          <p:cNvSpPr/>
+          <p:nvPr/>
+        </p:nvSpPr>
+        <p:spPr>
+          <a:xfrm>
+            <a:off x="2293279" y="659719"/>
+            <a:ext cx="356870" cy="375285"/>
+          </a:xfrm>
+          <a:prstGeom prst="rect">
+            <a:avLst/>
+          </a:prstGeom>
+          <a:solidFill>
+            <a:schemeClr val="accent6">
+              <a:lumMod val="60000"/>
+              <a:lumOff val="40000"/>
+            </a:schemeClr>
+          </a:solidFill>
+          <a:ln w="19050">
+            <a:solidFill>
+              <a:schemeClr val="tx1">
+                <a:lumMod val="65000"/>
+                <a:lumOff val="35000"/>
+              </a:schemeClr>
+            </a:solidFill>
+          </a:ln>
+        </p:spPr>
+        <p:style>
+          <a:lnRef idx="2">
+            <a:schemeClr val="accent1">
+              <a:lumMod val="75000"/>
+            </a:schemeClr>
+          </a:lnRef>
+          <a:fillRef idx="1">
+            <a:schemeClr val="accent1"/>
+          </a:fillRef>
+          <a:effectRef idx="0">
+            <a:srgbClr val="FFFFFF"/>
+          </a:effectRef>
+          <a:fontRef idx="minor">
+            <a:schemeClr val="lt1"/>
+          </a:fontRef>
+        </p:style>
+        <p:txBody>
+          <a:bodyPr rtlCol="0" anchor="ctr"/>
+          <a:lstStyle/>
+          <a:p>
+            <a:pPr algn="ctr"/>
+            <a:r>
+              <a:rPr lang="en-US" b="1" dirty="0">
+                <a:solidFill>
+                  <a:schemeClr val="tx1"/>
+                </a:solidFill>
+                <a:latin typeface="Calibri" panose="020F0502020204030204" charset="0"/>
+                <a:cs typeface="Calibri" panose="020F0502020204030204" charset="0"/>
+              </a:rPr>
+              <a:t>2</a:t>
+            </a:r>
+          </a:p>
+        </p:txBody>
+      </p:sp>
+      <p:cxnSp>
+        <p:nvCxnSpPr>
+          <p:cNvPr id="272" name="直接箭头连接符 271">
+            <a:extLst>
+              <a:ext uri="{FF2B5EF4-FFF2-40B4-BE49-F238E27FC236}">
+                <a16:creationId xmlns:a16="http://schemas.microsoft.com/office/drawing/2014/main" id="{8978B938-571B-963B-C50D-237DC339DCC9}"/>
+              </a:ext>
+            </a:extLst>
+          </p:cNvPr>
+          <p:cNvCxnSpPr>
+            <a:cxnSpLocks/>
+            <a:stCxn id="62" idx="3"/>
+            <a:endCxn id="217" idx="1"/>
+          </p:cNvCxnSpPr>
+          <p:nvPr/>
+        </p:nvCxnSpPr>
+        <p:spPr>
+          <a:xfrm flipV="1">
+            <a:off x="1936409" y="847362"/>
+            <a:ext cx="356870" cy="4518"/>
+          </a:xfrm>
+          <a:prstGeom prst="straightConnector1">
+            <a:avLst/>
+          </a:prstGeom>
+          <a:ln>
+            <a:tailEnd type="triangle"/>
+          </a:ln>
+        </p:spPr>
+        <p:style>
+          <a:lnRef idx="1">
+            <a:schemeClr val="dk1"/>
+          </a:lnRef>
+          <a:fillRef idx="0">
+            <a:schemeClr val="dk1"/>
+          </a:fillRef>
+          <a:effectRef idx="0">
+            <a:schemeClr val="dk1"/>
+          </a:effectRef>
+          <a:fontRef idx="minor">
+            <a:schemeClr val="tx1"/>
+          </a:fontRef>
+        </p:style>
+      </p:cxnSp>
+      <p:sp>
+        <p:nvSpPr>
+          <p:cNvPr id="7" name="文本框 6">
+            <a:extLst>
+              <a:ext uri="{FF2B5EF4-FFF2-40B4-BE49-F238E27FC236}">
+                <a16:creationId xmlns:a16="http://schemas.microsoft.com/office/drawing/2014/main" id="{77293093-D15E-6454-F696-971E026D9B12}"/>
+              </a:ext>
+            </a:extLst>
+          </p:cNvPr>
+          <p:cNvSpPr txBox="1"/>
+          <p:nvPr/>
+        </p:nvSpPr>
+        <p:spPr>
+          <a:xfrm>
+            <a:off x="5181971" y="659402"/>
+            <a:ext cx="3048591" cy="369332"/>
+          </a:xfrm>
+          <a:prstGeom prst="rect">
+            <a:avLst/>
+          </a:prstGeom>
+          <a:noFill/>
+        </p:spPr>
+        <p:txBody>
+          <a:bodyPr wrap="none" rtlCol="0">
+            <a:spAutoFit/>
+          </a:bodyPr>
+          <a:lstStyle/>
+          <a:p>
+            <a:r>
+              <a:rPr lang="en-US" altLang="zh-CN" b="1" dirty="0"/>
+              <a:t>Push</a:t>
+            </a:r>
+            <a:r>
+              <a:rPr lang="en-US" altLang="zh-CN" dirty="0"/>
+              <a:t> two nodes into the stack.</a:t>
+            </a:r>
+            <a:endParaRPr lang="zh-CN" altLang="en-US" dirty="0"/>
+          </a:p>
+        </p:txBody>
+      </p:sp>
+      <p:sp>
+        <p:nvSpPr>
+          <p:cNvPr id="12" name="Rectangles 4">
+            <a:extLst>
+              <a:ext uri="{FF2B5EF4-FFF2-40B4-BE49-F238E27FC236}">
+                <a16:creationId xmlns:a16="http://schemas.microsoft.com/office/drawing/2014/main" id="{EC1F936F-A7F0-BB9E-B466-3B1213272F3C}"/>
+              </a:ext>
+            </a:extLst>
+          </p:cNvPr>
+          <p:cNvSpPr/>
+          <p:nvPr/>
+        </p:nvSpPr>
+        <p:spPr>
+          <a:xfrm>
+            <a:off x="3015452" y="659402"/>
+            <a:ext cx="356870" cy="375285"/>
+          </a:xfrm>
+          <a:prstGeom prst="rect">
+            <a:avLst/>
+          </a:prstGeom>
+          <a:solidFill>
+            <a:schemeClr val="bg1"/>
+          </a:solidFill>
+          <a:ln w="19050">
+            <a:solidFill>
+              <a:schemeClr val="tx1">
+                <a:lumMod val="65000"/>
+                <a:lumOff val="35000"/>
+              </a:schemeClr>
+            </a:solidFill>
+          </a:ln>
+        </p:spPr>
+        <p:style>
+          <a:lnRef idx="2">
+            <a:schemeClr val="accent1">
+              <a:lumMod val="75000"/>
+            </a:schemeClr>
+          </a:lnRef>
+          <a:fillRef idx="1">
+            <a:schemeClr val="accent1"/>
+          </a:fillRef>
+          <a:effectRef idx="0">
+            <a:srgbClr val="FFFFFF"/>
+          </a:effectRef>
+          <a:fontRef idx="minor">
+            <a:schemeClr val="lt1"/>
+          </a:fontRef>
+        </p:style>
+        <p:txBody>
+          <a:bodyPr rtlCol="0" anchor="ctr"/>
+          <a:lstStyle/>
+          <a:p>
+            <a:pPr algn="ctr"/>
+            <a:r>
+              <a:rPr lang="en-US" b="1" dirty="0">
+                <a:solidFill>
+                  <a:schemeClr val="tx1"/>
+                </a:solidFill>
+                <a:latin typeface="Calibri" panose="020F0502020204030204" charset="0"/>
+                <a:cs typeface="Calibri" panose="020F0502020204030204" charset="0"/>
+              </a:rPr>
+              <a:t>3</a:t>
+            </a:r>
+          </a:p>
+        </p:txBody>
+      </p:sp>
+      <p:sp>
+        <p:nvSpPr>
+          <p:cNvPr id="13" name="Rectangles 4">
+            <a:extLst>
+              <a:ext uri="{FF2B5EF4-FFF2-40B4-BE49-F238E27FC236}">
+                <a16:creationId xmlns:a16="http://schemas.microsoft.com/office/drawing/2014/main" id="{B5B06EE0-6E13-B2D5-2B1C-F082FF685955}"/>
+              </a:ext>
+            </a:extLst>
+          </p:cNvPr>
+          <p:cNvSpPr/>
+          <p:nvPr/>
+        </p:nvSpPr>
+        <p:spPr>
+          <a:xfrm>
+            <a:off x="3737625" y="664173"/>
+            <a:ext cx="356870" cy="375285"/>
+          </a:xfrm>
+          <a:prstGeom prst="rect">
+            <a:avLst/>
+          </a:prstGeom>
+          <a:solidFill>
+            <a:schemeClr val="bg1"/>
+          </a:solidFill>
+          <a:ln w="19050">
+            <a:solidFill>
+              <a:schemeClr val="tx1">
+                <a:lumMod val="65000"/>
+                <a:lumOff val="35000"/>
+              </a:schemeClr>
+            </a:solidFill>
+          </a:ln>
+        </p:spPr>
+        <p:style>
+          <a:lnRef idx="2">
+            <a:schemeClr val="accent1">
+              <a:lumMod val="75000"/>
+            </a:schemeClr>
+          </a:lnRef>
+          <a:fillRef idx="1">
+            <a:schemeClr val="accent1"/>
+          </a:fillRef>
+          <a:effectRef idx="0">
+            <a:srgbClr val="FFFFFF"/>
+          </a:effectRef>
+          <a:fontRef idx="minor">
+            <a:schemeClr val="lt1"/>
+          </a:fontRef>
+        </p:style>
+        <p:txBody>
+          <a:bodyPr rtlCol="0" anchor="ctr"/>
+          <a:lstStyle/>
+          <a:p>
+            <a:pPr algn="ctr"/>
+            <a:r>
+              <a:rPr lang="en-US" b="1" dirty="0">
+                <a:solidFill>
+                  <a:schemeClr val="tx1"/>
+                </a:solidFill>
+                <a:latin typeface="Calibri" panose="020F0502020204030204" charset="0"/>
+                <a:cs typeface="Calibri" panose="020F0502020204030204" charset="0"/>
+              </a:rPr>
+              <a:t>4</a:t>
+            </a:r>
+          </a:p>
+        </p:txBody>
+      </p:sp>
+      <p:cxnSp>
+        <p:nvCxnSpPr>
+          <p:cNvPr id="14" name="直接箭头连接符 13">
+            <a:extLst>
+              <a:ext uri="{FF2B5EF4-FFF2-40B4-BE49-F238E27FC236}">
+                <a16:creationId xmlns:a16="http://schemas.microsoft.com/office/drawing/2014/main" id="{A6F66341-D007-24AF-73C2-F436ACE35BD3}"/>
+              </a:ext>
+            </a:extLst>
+          </p:cNvPr>
+          <p:cNvCxnSpPr>
+            <a:cxnSpLocks/>
+            <a:stCxn id="217" idx="3"/>
+            <a:endCxn id="12" idx="1"/>
+          </p:cNvCxnSpPr>
+          <p:nvPr/>
+        </p:nvCxnSpPr>
+        <p:spPr>
+          <a:xfrm flipV="1">
+            <a:off x="2650149" y="847045"/>
+            <a:ext cx="365303" cy="317"/>
+          </a:xfrm>
+          <a:prstGeom prst="straightConnector1">
+            <a:avLst/>
+          </a:prstGeom>
+          <a:ln>
+            <a:tailEnd type="triangle"/>
+          </a:ln>
+        </p:spPr>
+        <p:style>
+          <a:lnRef idx="1">
+            <a:schemeClr val="dk1"/>
+          </a:lnRef>
+          <a:fillRef idx="0">
+            <a:schemeClr val="dk1"/>
+          </a:fillRef>
+          <a:effectRef idx="0">
+            <a:schemeClr val="dk1"/>
+          </a:effectRef>
+          <a:fontRef idx="minor">
+            <a:schemeClr val="tx1"/>
+          </a:fontRef>
+        </p:style>
+      </p:cxnSp>
+      <p:cxnSp>
+        <p:nvCxnSpPr>
+          <p:cNvPr id="17" name="直接箭头连接符 16">
+            <a:extLst>
+              <a:ext uri="{FF2B5EF4-FFF2-40B4-BE49-F238E27FC236}">
+                <a16:creationId xmlns:a16="http://schemas.microsoft.com/office/drawing/2014/main" id="{0CAC2DE4-0E67-397A-C175-2B4AD661B0C6}"/>
+              </a:ext>
+            </a:extLst>
+          </p:cNvPr>
+          <p:cNvCxnSpPr>
+            <a:cxnSpLocks/>
+            <a:stCxn id="12" idx="3"/>
+            <a:endCxn id="13" idx="1"/>
+          </p:cNvCxnSpPr>
+          <p:nvPr/>
+        </p:nvCxnSpPr>
+        <p:spPr>
+          <a:xfrm>
+            <a:off x="3372322" y="847045"/>
+            <a:ext cx="365303" cy="4771"/>
+          </a:xfrm>
+          <a:prstGeom prst="straightConnector1">
+            <a:avLst/>
+          </a:prstGeom>
+          <a:ln>
+            <a:tailEnd type="triangle"/>
+          </a:ln>
+        </p:spPr>
+        <p:style>
+          <a:lnRef idx="1">
+            <a:schemeClr val="dk1"/>
+          </a:lnRef>
+          <a:fillRef idx="0">
+            <a:schemeClr val="dk1"/>
+          </a:fillRef>
+          <a:effectRef idx="0">
+            <a:schemeClr val="dk1"/>
+          </a:effectRef>
+          <a:fontRef idx="minor">
+            <a:schemeClr val="tx1"/>
+          </a:fontRef>
+        </p:style>
+      </p:cxnSp>
+      <p:sp>
+        <p:nvSpPr>
+          <p:cNvPr id="28" name="Rectangles 4">
+            <a:extLst>
+              <a:ext uri="{FF2B5EF4-FFF2-40B4-BE49-F238E27FC236}">
+                <a16:creationId xmlns:a16="http://schemas.microsoft.com/office/drawing/2014/main" id="{9A5A0DA5-D17F-99BF-32DB-9D4F7A9805F2}"/>
+              </a:ext>
+            </a:extLst>
+          </p:cNvPr>
+          <p:cNvSpPr/>
+          <p:nvPr/>
+        </p:nvSpPr>
+        <p:spPr>
+          <a:xfrm>
+            <a:off x="4459798" y="659402"/>
+            <a:ext cx="356870" cy="375285"/>
+          </a:xfrm>
+          <a:prstGeom prst="rect">
+            <a:avLst/>
+          </a:prstGeom>
+          <a:solidFill>
+            <a:schemeClr val="bg1"/>
+          </a:solidFill>
+          <a:ln w="19050">
+            <a:solidFill>
+              <a:schemeClr val="tx1">
+                <a:lumMod val="65000"/>
+                <a:lumOff val="35000"/>
+              </a:schemeClr>
+            </a:solidFill>
+          </a:ln>
+        </p:spPr>
+        <p:style>
+          <a:lnRef idx="2">
+            <a:schemeClr val="accent1">
+              <a:lumMod val="75000"/>
+            </a:schemeClr>
+          </a:lnRef>
+          <a:fillRef idx="1">
+            <a:schemeClr val="accent1"/>
+          </a:fillRef>
+          <a:effectRef idx="0">
+            <a:srgbClr val="FFFFFF"/>
+          </a:effectRef>
+          <a:fontRef idx="minor">
+            <a:schemeClr val="lt1"/>
+          </a:fontRef>
+        </p:style>
+        <p:txBody>
+          <a:bodyPr rtlCol="0" anchor="ctr"/>
+          <a:lstStyle/>
+          <a:p>
+            <a:pPr algn="ctr"/>
+            <a:r>
+              <a:rPr lang="en-US" b="1" dirty="0">
+                <a:solidFill>
+                  <a:schemeClr val="tx1"/>
+                </a:solidFill>
+                <a:latin typeface="Calibri" panose="020F0502020204030204" charset="0"/>
+                <a:cs typeface="Calibri" panose="020F0502020204030204" charset="0"/>
+              </a:rPr>
+              <a:t>5</a:t>
+            </a:r>
+          </a:p>
+        </p:txBody>
+      </p:sp>
+      <p:cxnSp>
+        <p:nvCxnSpPr>
+          <p:cNvPr id="29" name="直接箭头连接符 28">
+            <a:extLst>
+              <a:ext uri="{FF2B5EF4-FFF2-40B4-BE49-F238E27FC236}">
+                <a16:creationId xmlns:a16="http://schemas.microsoft.com/office/drawing/2014/main" id="{CA05C442-20CB-C577-381D-F12A3F4ECA0F}"/>
+              </a:ext>
+            </a:extLst>
+          </p:cNvPr>
+          <p:cNvCxnSpPr>
+            <a:cxnSpLocks/>
+            <a:stCxn id="13" idx="3"/>
+            <a:endCxn id="28" idx="1"/>
+          </p:cNvCxnSpPr>
+          <p:nvPr/>
+        </p:nvCxnSpPr>
+        <p:spPr>
+          <a:xfrm flipV="1">
+            <a:off x="4094495" y="847045"/>
+            <a:ext cx="365303" cy="4771"/>
+          </a:xfrm>
+          <a:prstGeom prst="straightConnector1">
+            <a:avLst/>
+          </a:prstGeom>
+          <a:ln>
+            <a:tailEnd type="triangle"/>
+          </a:ln>
+        </p:spPr>
+        <p:style>
+          <a:lnRef idx="1">
+            <a:schemeClr val="dk1"/>
+          </a:lnRef>
+          <a:fillRef idx="0">
+            <a:schemeClr val="dk1"/>
+          </a:fillRef>
+          <a:effectRef idx="0">
+            <a:schemeClr val="dk1"/>
+          </a:effectRef>
+          <a:fontRef idx="minor">
+            <a:schemeClr val="tx1"/>
+          </a:fontRef>
+        </p:style>
+      </p:cxnSp>
+      <p:sp>
+        <p:nvSpPr>
+          <p:cNvPr id="38" name="Rectangles 4">
+            <a:extLst>
+              <a:ext uri="{FF2B5EF4-FFF2-40B4-BE49-F238E27FC236}">
+                <a16:creationId xmlns:a16="http://schemas.microsoft.com/office/drawing/2014/main" id="{EC56A846-72A3-C4CE-C77B-181639D70F18}"/>
+              </a:ext>
+            </a:extLst>
+          </p:cNvPr>
+          <p:cNvSpPr/>
+          <p:nvPr/>
+        </p:nvSpPr>
+        <p:spPr>
+          <a:xfrm>
+            <a:off x="1579538" y="1328365"/>
+            <a:ext cx="1867669" cy="375285"/>
+          </a:xfrm>
+          <a:prstGeom prst="rect">
+            <a:avLst/>
+          </a:prstGeom>
+          <a:solidFill>
+            <a:schemeClr val="bg1"/>
+          </a:solidFill>
+          <a:ln w="19050">
+            <a:solidFill>
+              <a:schemeClr val="tx1">
+                <a:lumMod val="65000"/>
+                <a:lumOff val="35000"/>
+              </a:schemeClr>
+            </a:solidFill>
+          </a:ln>
+        </p:spPr>
+        <p:style>
+          <a:lnRef idx="2">
+            <a:schemeClr val="accent1">
+              <a:lumMod val="75000"/>
+            </a:schemeClr>
+          </a:lnRef>
+          <a:fillRef idx="1">
+            <a:schemeClr val="accent1"/>
+          </a:fillRef>
+          <a:effectRef idx="0">
+            <a:srgbClr val="FFFFFF"/>
+          </a:effectRef>
+          <a:fontRef idx="minor">
+            <a:schemeClr val="lt1"/>
+          </a:fontRef>
+        </p:style>
+        <p:txBody>
+          <a:bodyPr rtlCol="0" anchor="ctr"/>
+          <a:lstStyle/>
+          <a:p>
+            <a:pPr algn="ctr"/>
+            <a:endParaRPr lang="en-US" b="1" dirty="0">
+              <a:solidFill>
+                <a:schemeClr val="tx1"/>
+              </a:solidFill>
+              <a:latin typeface="Calibri" panose="020F0502020204030204" charset="0"/>
+              <a:cs typeface="Calibri" panose="020F0502020204030204" charset="0"/>
+            </a:endParaRPr>
+          </a:p>
+        </p:txBody>
+      </p:sp>
+      <p:sp>
+        <p:nvSpPr>
+          <p:cNvPr id="39" name="Rectangles 4">
+            <a:extLst>
+              <a:ext uri="{FF2B5EF4-FFF2-40B4-BE49-F238E27FC236}">
+                <a16:creationId xmlns:a16="http://schemas.microsoft.com/office/drawing/2014/main" id="{3B3C9A9B-5229-CC05-7996-76E2B011A330}"/>
+              </a:ext>
+            </a:extLst>
+          </p:cNvPr>
+          <p:cNvSpPr/>
+          <p:nvPr/>
+        </p:nvSpPr>
+        <p:spPr>
+          <a:xfrm>
+            <a:off x="1579538" y="1328365"/>
+            <a:ext cx="356870" cy="375285"/>
+          </a:xfrm>
+          <a:prstGeom prst="rect">
+            <a:avLst/>
+          </a:prstGeom>
+          <a:solidFill>
+            <a:schemeClr val="bg1"/>
+          </a:solidFill>
+          <a:ln w="19050">
+            <a:solidFill>
+              <a:schemeClr val="tx1">
+                <a:lumMod val="65000"/>
+                <a:lumOff val="35000"/>
+              </a:schemeClr>
+            </a:solidFill>
+          </a:ln>
+        </p:spPr>
+        <p:style>
+          <a:lnRef idx="2">
+            <a:schemeClr val="accent1">
+              <a:lumMod val="75000"/>
+            </a:schemeClr>
+          </a:lnRef>
+          <a:fillRef idx="1">
+            <a:schemeClr val="accent1"/>
+          </a:fillRef>
+          <a:effectRef idx="0">
+            <a:srgbClr val="FFFFFF"/>
+          </a:effectRef>
+          <a:fontRef idx="minor">
+            <a:schemeClr val="lt1"/>
+          </a:fontRef>
+        </p:style>
+        <p:txBody>
+          <a:bodyPr rtlCol="0" anchor="ctr"/>
+          <a:lstStyle/>
+          <a:p>
+            <a:pPr algn="ctr"/>
+            <a:r>
+              <a:rPr lang="en-US" b="1" dirty="0">
+                <a:solidFill>
+                  <a:schemeClr val="tx1"/>
+                </a:solidFill>
+                <a:latin typeface="Calibri" panose="020F0502020204030204" charset="0"/>
+                <a:cs typeface="Calibri" panose="020F0502020204030204" charset="0"/>
+              </a:rPr>
+              <a:t>1</a:t>
+            </a:r>
+          </a:p>
+        </p:txBody>
+      </p:sp>
+      <p:sp>
+        <p:nvSpPr>
+          <p:cNvPr id="40" name="Rectangles 4">
+            <a:extLst>
+              <a:ext uri="{FF2B5EF4-FFF2-40B4-BE49-F238E27FC236}">
+                <a16:creationId xmlns:a16="http://schemas.microsoft.com/office/drawing/2014/main" id="{73657827-BB32-D576-06B5-62A4941BCF8B}"/>
+              </a:ext>
+            </a:extLst>
+          </p:cNvPr>
+          <p:cNvSpPr/>
+          <p:nvPr/>
+        </p:nvSpPr>
+        <p:spPr>
+          <a:xfrm>
+            <a:off x="2293279" y="1323847"/>
+            <a:ext cx="356870" cy="375285"/>
+          </a:xfrm>
+          <a:prstGeom prst="rect">
+            <a:avLst/>
+          </a:prstGeom>
+          <a:solidFill>
+            <a:schemeClr val="bg1"/>
+          </a:solidFill>
+          <a:ln w="19050">
+            <a:solidFill>
+              <a:schemeClr val="tx1">
+                <a:lumMod val="65000"/>
+                <a:lumOff val="35000"/>
+              </a:schemeClr>
+            </a:solidFill>
+          </a:ln>
+        </p:spPr>
+        <p:style>
+          <a:lnRef idx="2">
+            <a:schemeClr val="accent1">
+              <a:lumMod val="75000"/>
+            </a:schemeClr>
+          </a:lnRef>
+          <a:fillRef idx="1">
+            <a:schemeClr val="accent1"/>
+          </a:fillRef>
+          <a:effectRef idx="0">
+            <a:srgbClr val="FFFFFF"/>
+          </a:effectRef>
+          <a:fontRef idx="minor">
+            <a:schemeClr val="lt1"/>
+          </a:fontRef>
+        </p:style>
+        <p:txBody>
+          <a:bodyPr rtlCol="0" anchor="ctr"/>
+          <a:lstStyle/>
+          <a:p>
+            <a:pPr algn="ctr"/>
+            <a:r>
+              <a:rPr lang="en-US" b="1" dirty="0">
+                <a:solidFill>
+                  <a:schemeClr val="tx1"/>
+                </a:solidFill>
+                <a:latin typeface="Calibri" panose="020F0502020204030204" charset="0"/>
+                <a:cs typeface="Calibri" panose="020F0502020204030204" charset="0"/>
+              </a:rPr>
+              <a:t>2</a:t>
+            </a:r>
+          </a:p>
+        </p:txBody>
+      </p:sp>
+      <p:sp>
+        <p:nvSpPr>
+          <p:cNvPr id="41" name="Rectangles 4">
+            <a:extLst>
+              <a:ext uri="{FF2B5EF4-FFF2-40B4-BE49-F238E27FC236}">
+                <a16:creationId xmlns:a16="http://schemas.microsoft.com/office/drawing/2014/main" id="{43FA46A7-3BEA-0FD9-60C7-5F3F37E2F674}"/>
+              </a:ext>
+            </a:extLst>
+          </p:cNvPr>
+          <p:cNvSpPr/>
+          <p:nvPr/>
+        </p:nvSpPr>
+        <p:spPr>
+          <a:xfrm>
+            <a:off x="2658582" y="1996003"/>
+            <a:ext cx="356870" cy="375285"/>
+          </a:xfrm>
+          <a:prstGeom prst="rect">
+            <a:avLst/>
+          </a:prstGeom>
+          <a:solidFill>
+            <a:schemeClr val="bg1"/>
+          </a:solidFill>
+          <a:ln w="19050">
+            <a:solidFill>
+              <a:schemeClr val="tx1">
+                <a:lumMod val="65000"/>
+                <a:lumOff val="35000"/>
+              </a:schemeClr>
+            </a:solidFill>
+          </a:ln>
+        </p:spPr>
+        <p:style>
+          <a:lnRef idx="2">
+            <a:schemeClr val="accent1">
+              <a:lumMod val="75000"/>
+            </a:schemeClr>
+          </a:lnRef>
+          <a:fillRef idx="1">
+            <a:schemeClr val="accent1"/>
+          </a:fillRef>
+          <a:effectRef idx="0">
+            <a:srgbClr val="FFFFFF"/>
+          </a:effectRef>
+          <a:fontRef idx="minor">
+            <a:schemeClr val="lt1"/>
+          </a:fontRef>
+        </p:style>
+        <p:txBody>
+          <a:bodyPr rtlCol="0" anchor="ctr"/>
+          <a:lstStyle/>
+          <a:p>
+            <a:pPr algn="ctr"/>
+            <a:r>
+              <a:rPr lang="en-US" b="1" dirty="0">
+                <a:solidFill>
+                  <a:schemeClr val="tx1"/>
+                </a:solidFill>
+                <a:latin typeface="Calibri" panose="020F0502020204030204" charset="0"/>
+                <a:cs typeface="Calibri" panose="020F0502020204030204" charset="0"/>
+              </a:rPr>
+              <a:t>2</a:t>
+            </a:r>
+          </a:p>
+        </p:txBody>
+      </p:sp>
+      <p:sp>
+        <p:nvSpPr>
+          <p:cNvPr id="42" name="Rectangles 4">
+            <a:extLst>
+              <a:ext uri="{FF2B5EF4-FFF2-40B4-BE49-F238E27FC236}">
+                <a16:creationId xmlns:a16="http://schemas.microsoft.com/office/drawing/2014/main" id="{DA602E78-6364-4B73-7E05-1F6F1D1E8944}"/>
+              </a:ext>
+            </a:extLst>
+          </p:cNvPr>
+          <p:cNvSpPr/>
+          <p:nvPr/>
+        </p:nvSpPr>
+        <p:spPr>
+          <a:xfrm>
+            <a:off x="3372323" y="1996003"/>
+            <a:ext cx="356870" cy="375285"/>
+          </a:xfrm>
+          <a:prstGeom prst="rect">
+            <a:avLst/>
+          </a:prstGeom>
+          <a:solidFill>
+            <a:schemeClr val="bg1"/>
+          </a:solidFill>
+          <a:ln w="19050">
+            <a:solidFill>
+              <a:schemeClr val="tx1">
+                <a:lumMod val="65000"/>
+                <a:lumOff val="35000"/>
+              </a:schemeClr>
+            </a:solidFill>
+          </a:ln>
+        </p:spPr>
+        <p:style>
+          <a:lnRef idx="2">
+            <a:schemeClr val="accent1">
+              <a:lumMod val="75000"/>
+            </a:schemeClr>
+          </a:lnRef>
+          <a:fillRef idx="1">
+            <a:schemeClr val="accent1"/>
+          </a:fillRef>
+          <a:effectRef idx="0">
+            <a:srgbClr val="FFFFFF"/>
+          </a:effectRef>
+          <a:fontRef idx="minor">
+            <a:schemeClr val="lt1"/>
+          </a:fontRef>
+        </p:style>
+        <p:txBody>
+          <a:bodyPr rtlCol="0" anchor="ctr"/>
+          <a:lstStyle/>
+          <a:p>
+            <a:pPr algn="ctr"/>
+            <a:r>
+              <a:rPr lang="en-US" b="1" dirty="0">
+                <a:solidFill>
+                  <a:schemeClr val="tx1"/>
+                </a:solidFill>
+                <a:latin typeface="Calibri" panose="020F0502020204030204" charset="0"/>
+                <a:cs typeface="Calibri" panose="020F0502020204030204" charset="0"/>
+              </a:rPr>
+              <a:t>1</a:t>
+            </a:r>
+          </a:p>
+        </p:txBody>
+      </p:sp>
+      <p:cxnSp>
+        <p:nvCxnSpPr>
+          <p:cNvPr id="43" name="直接箭头连接符 42">
+            <a:extLst>
+              <a:ext uri="{FF2B5EF4-FFF2-40B4-BE49-F238E27FC236}">
+                <a16:creationId xmlns:a16="http://schemas.microsoft.com/office/drawing/2014/main" id="{B9FFEF9B-C6C9-87C6-A47D-2231F172A3AE}"/>
+              </a:ext>
+            </a:extLst>
+          </p:cNvPr>
+          <p:cNvCxnSpPr>
+            <a:cxnSpLocks/>
+            <a:stCxn id="41" idx="3"/>
+            <a:endCxn id="42" idx="1"/>
+          </p:cNvCxnSpPr>
+          <p:nvPr/>
+        </p:nvCxnSpPr>
+        <p:spPr>
+          <a:xfrm>
+            <a:off x="3015452" y="2183646"/>
+            <a:ext cx="356871" cy="0"/>
+          </a:xfrm>
+          <a:prstGeom prst="straightConnector1">
+            <a:avLst/>
+          </a:prstGeom>
+          <a:ln>
+            <a:tailEnd type="triangle"/>
+          </a:ln>
+        </p:spPr>
+        <p:style>
+          <a:lnRef idx="1">
+            <a:schemeClr val="dk1"/>
+          </a:lnRef>
+          <a:fillRef idx="0">
+            <a:schemeClr val="dk1"/>
+          </a:fillRef>
+          <a:effectRef idx="0">
+            <a:schemeClr val="dk1"/>
+          </a:effectRef>
+          <a:fontRef idx="minor">
+            <a:schemeClr val="tx1"/>
+          </a:fontRef>
+        </p:style>
+      </p:cxnSp>
+      <p:sp>
+        <p:nvSpPr>
+          <p:cNvPr id="46" name="Rectangles 4">
+            <a:extLst>
+              <a:ext uri="{FF2B5EF4-FFF2-40B4-BE49-F238E27FC236}">
+                <a16:creationId xmlns:a16="http://schemas.microsoft.com/office/drawing/2014/main" id="{7EC164A9-967B-69B6-2D90-A4C3921A65BC}"/>
+              </a:ext>
+            </a:extLst>
+          </p:cNvPr>
+          <p:cNvSpPr/>
+          <p:nvPr/>
+        </p:nvSpPr>
+        <p:spPr>
+          <a:xfrm>
+            <a:off x="1579539" y="2749330"/>
+            <a:ext cx="356870" cy="375285"/>
+          </a:xfrm>
+          <a:prstGeom prst="rect">
+            <a:avLst/>
+          </a:prstGeom>
+          <a:solidFill>
+            <a:schemeClr val="bg1"/>
+          </a:solidFill>
+          <a:ln w="19050">
+            <a:solidFill>
+              <a:schemeClr val="tx1">
+                <a:lumMod val="65000"/>
+                <a:lumOff val="35000"/>
+              </a:schemeClr>
+            </a:solidFill>
+          </a:ln>
+        </p:spPr>
+        <p:style>
+          <a:lnRef idx="2">
+            <a:schemeClr val="accent1">
+              <a:lumMod val="75000"/>
+            </a:schemeClr>
+          </a:lnRef>
+          <a:fillRef idx="1">
+            <a:schemeClr val="accent1"/>
+          </a:fillRef>
+          <a:effectRef idx="0">
+            <a:srgbClr val="FFFFFF"/>
+          </a:effectRef>
+          <a:fontRef idx="minor">
+            <a:schemeClr val="lt1"/>
+          </a:fontRef>
+        </p:style>
+        <p:txBody>
+          <a:bodyPr rtlCol="0" anchor="ctr"/>
+          <a:lstStyle/>
+          <a:p>
+            <a:pPr algn="ctr"/>
+            <a:r>
+              <a:rPr lang="en-US" b="1" dirty="0">
+                <a:solidFill>
+                  <a:schemeClr val="tx1"/>
+                </a:solidFill>
+                <a:latin typeface="Calibri" panose="020F0502020204030204" charset="0"/>
+                <a:cs typeface="Calibri" panose="020F0502020204030204" charset="0"/>
+              </a:rPr>
+              <a:t>1</a:t>
+            </a:r>
+          </a:p>
+        </p:txBody>
+      </p:sp>
+      <p:sp>
+        <p:nvSpPr>
+          <p:cNvPr id="47" name="Rectangles 4">
+            <a:extLst>
+              <a:ext uri="{FF2B5EF4-FFF2-40B4-BE49-F238E27FC236}">
+                <a16:creationId xmlns:a16="http://schemas.microsoft.com/office/drawing/2014/main" id="{2AC2AF11-350C-AE9D-B044-EBEC029A7BCF}"/>
+              </a:ext>
+            </a:extLst>
+          </p:cNvPr>
+          <p:cNvSpPr/>
+          <p:nvPr/>
+        </p:nvSpPr>
+        <p:spPr>
+          <a:xfrm>
+            <a:off x="2293279" y="2744812"/>
+            <a:ext cx="356870" cy="375285"/>
+          </a:xfrm>
+          <a:prstGeom prst="rect">
+            <a:avLst/>
+          </a:prstGeom>
+          <a:solidFill>
+            <a:schemeClr val="bg1"/>
+          </a:solidFill>
+          <a:ln w="19050">
+            <a:solidFill>
+              <a:schemeClr val="tx1">
+                <a:lumMod val="65000"/>
+                <a:lumOff val="35000"/>
+              </a:schemeClr>
+            </a:solidFill>
+          </a:ln>
+        </p:spPr>
+        <p:style>
+          <a:lnRef idx="2">
+            <a:schemeClr val="accent1">
+              <a:lumMod val="75000"/>
+            </a:schemeClr>
+          </a:lnRef>
+          <a:fillRef idx="1">
+            <a:schemeClr val="accent1"/>
+          </a:fillRef>
+          <a:effectRef idx="0">
+            <a:srgbClr val="FFFFFF"/>
+          </a:effectRef>
+          <a:fontRef idx="minor">
+            <a:schemeClr val="lt1"/>
+          </a:fontRef>
+        </p:style>
+        <p:txBody>
+          <a:bodyPr rtlCol="0" anchor="ctr"/>
+          <a:lstStyle/>
+          <a:p>
+            <a:pPr algn="ctr"/>
+            <a:r>
+              <a:rPr lang="en-US" b="1" dirty="0">
+                <a:solidFill>
+                  <a:schemeClr val="tx1"/>
+                </a:solidFill>
+                <a:latin typeface="Calibri" panose="020F0502020204030204" charset="0"/>
+                <a:cs typeface="Calibri" panose="020F0502020204030204" charset="0"/>
+              </a:rPr>
+              <a:t>2</a:t>
+            </a:r>
+          </a:p>
+        </p:txBody>
+      </p:sp>
+      <p:cxnSp>
+        <p:nvCxnSpPr>
+          <p:cNvPr id="48" name="直接箭头连接符 47">
+            <a:extLst>
+              <a:ext uri="{FF2B5EF4-FFF2-40B4-BE49-F238E27FC236}">
+                <a16:creationId xmlns:a16="http://schemas.microsoft.com/office/drawing/2014/main" id="{63FF89BC-36D3-7782-6173-75C656257350}"/>
+              </a:ext>
+            </a:extLst>
+          </p:cNvPr>
+          <p:cNvCxnSpPr>
+            <a:cxnSpLocks/>
+            <a:stCxn id="46" idx="3"/>
+            <a:endCxn id="47" idx="1"/>
+          </p:cNvCxnSpPr>
+          <p:nvPr/>
+        </p:nvCxnSpPr>
+        <p:spPr>
+          <a:xfrm flipV="1">
+            <a:off x="1936409" y="2932455"/>
+            <a:ext cx="356870" cy="4518"/>
+          </a:xfrm>
+          <a:prstGeom prst="straightConnector1">
+            <a:avLst/>
+          </a:prstGeom>
+          <a:ln>
+            <a:tailEnd type="triangle"/>
+          </a:ln>
+        </p:spPr>
+        <p:style>
+          <a:lnRef idx="1">
+            <a:schemeClr val="dk1"/>
+          </a:lnRef>
+          <a:fillRef idx="0">
+            <a:schemeClr val="dk1"/>
+          </a:fillRef>
+          <a:effectRef idx="0">
+            <a:schemeClr val="dk1"/>
+          </a:effectRef>
+          <a:fontRef idx="minor">
+            <a:schemeClr val="tx1"/>
+          </a:fontRef>
+        </p:style>
+      </p:cxnSp>
+      <p:sp>
+        <p:nvSpPr>
+          <p:cNvPr id="50" name="Rectangles 4">
+            <a:extLst>
+              <a:ext uri="{FF2B5EF4-FFF2-40B4-BE49-F238E27FC236}">
+                <a16:creationId xmlns:a16="http://schemas.microsoft.com/office/drawing/2014/main" id="{5EC15424-0C72-4214-5D0E-B0B6EF9ED615}"/>
+              </a:ext>
+            </a:extLst>
+          </p:cNvPr>
+          <p:cNvSpPr/>
+          <p:nvPr/>
+        </p:nvSpPr>
+        <p:spPr>
+          <a:xfrm>
+            <a:off x="3015452" y="2744495"/>
+            <a:ext cx="356870" cy="375285"/>
+          </a:xfrm>
+          <a:prstGeom prst="rect">
+            <a:avLst/>
+          </a:prstGeom>
+          <a:solidFill>
+            <a:schemeClr val="bg1"/>
+          </a:solidFill>
+          <a:ln w="19050">
+            <a:solidFill>
+              <a:schemeClr val="tx1">
+                <a:lumMod val="65000"/>
+                <a:lumOff val="35000"/>
+              </a:schemeClr>
+            </a:solidFill>
+          </a:ln>
+        </p:spPr>
+        <p:style>
+          <a:lnRef idx="2">
+            <a:schemeClr val="accent1">
+              <a:lumMod val="75000"/>
+            </a:schemeClr>
+          </a:lnRef>
+          <a:fillRef idx="1">
+            <a:schemeClr val="accent1"/>
+          </a:fillRef>
+          <a:effectRef idx="0">
+            <a:srgbClr val="FFFFFF"/>
+          </a:effectRef>
+          <a:fontRef idx="minor">
+            <a:schemeClr val="lt1"/>
+          </a:fontRef>
+        </p:style>
+        <p:txBody>
+          <a:bodyPr rtlCol="0" anchor="ctr"/>
+          <a:lstStyle/>
+          <a:p>
+            <a:pPr algn="ctr"/>
+            <a:r>
+              <a:rPr lang="en-US" b="1" dirty="0">
+                <a:solidFill>
+                  <a:schemeClr val="tx1"/>
+                </a:solidFill>
+                <a:latin typeface="Calibri" panose="020F0502020204030204" charset="0"/>
+                <a:cs typeface="Calibri" panose="020F0502020204030204" charset="0"/>
+              </a:rPr>
+              <a:t>3</a:t>
+            </a:r>
+          </a:p>
+        </p:txBody>
+      </p:sp>
+      <p:sp>
+        <p:nvSpPr>
+          <p:cNvPr id="51" name="Rectangles 4">
+            <a:extLst>
+              <a:ext uri="{FF2B5EF4-FFF2-40B4-BE49-F238E27FC236}">
+                <a16:creationId xmlns:a16="http://schemas.microsoft.com/office/drawing/2014/main" id="{F5DBA16D-231E-578B-CE03-39CB6EBD7D3C}"/>
+              </a:ext>
+            </a:extLst>
+          </p:cNvPr>
+          <p:cNvSpPr/>
+          <p:nvPr/>
+        </p:nvSpPr>
+        <p:spPr>
+          <a:xfrm>
+            <a:off x="3737625" y="2749266"/>
+            <a:ext cx="356870" cy="375285"/>
+          </a:xfrm>
+          <a:prstGeom prst="rect">
+            <a:avLst/>
+          </a:prstGeom>
+          <a:solidFill>
+            <a:schemeClr val="bg1"/>
+          </a:solidFill>
+          <a:ln w="19050">
+            <a:solidFill>
+              <a:schemeClr val="tx1">
+                <a:lumMod val="65000"/>
+                <a:lumOff val="35000"/>
+              </a:schemeClr>
+            </a:solidFill>
+          </a:ln>
+        </p:spPr>
+        <p:style>
+          <a:lnRef idx="2">
+            <a:schemeClr val="accent1">
+              <a:lumMod val="75000"/>
+            </a:schemeClr>
+          </a:lnRef>
+          <a:fillRef idx="1">
+            <a:schemeClr val="accent1"/>
+          </a:fillRef>
+          <a:effectRef idx="0">
+            <a:srgbClr val="FFFFFF"/>
+          </a:effectRef>
+          <a:fontRef idx="minor">
+            <a:schemeClr val="lt1"/>
+          </a:fontRef>
+        </p:style>
+        <p:txBody>
+          <a:bodyPr rtlCol="0" anchor="ctr"/>
+          <a:lstStyle/>
+          <a:p>
+            <a:pPr algn="ctr"/>
+            <a:r>
+              <a:rPr lang="en-US" b="1" dirty="0">
+                <a:solidFill>
+                  <a:schemeClr val="tx1"/>
+                </a:solidFill>
+                <a:latin typeface="Calibri" panose="020F0502020204030204" charset="0"/>
+                <a:cs typeface="Calibri" panose="020F0502020204030204" charset="0"/>
+              </a:rPr>
+              <a:t>4</a:t>
+            </a:r>
+          </a:p>
+        </p:txBody>
+      </p:sp>
+      <p:cxnSp>
+        <p:nvCxnSpPr>
+          <p:cNvPr id="52" name="直接箭头连接符 51">
+            <a:extLst>
+              <a:ext uri="{FF2B5EF4-FFF2-40B4-BE49-F238E27FC236}">
+                <a16:creationId xmlns:a16="http://schemas.microsoft.com/office/drawing/2014/main" id="{2E2E0100-F8DF-65D0-B205-DD598B187AC5}"/>
+              </a:ext>
+            </a:extLst>
+          </p:cNvPr>
+          <p:cNvCxnSpPr>
+            <a:cxnSpLocks/>
+            <a:stCxn id="47" idx="3"/>
+            <a:endCxn id="50" idx="1"/>
+          </p:cNvCxnSpPr>
+          <p:nvPr/>
+        </p:nvCxnSpPr>
+        <p:spPr>
+          <a:xfrm flipV="1">
+            <a:off x="2650149" y="2932138"/>
+            <a:ext cx="365303" cy="317"/>
+          </a:xfrm>
+          <a:prstGeom prst="straightConnector1">
+            <a:avLst/>
+          </a:prstGeom>
+          <a:ln>
+            <a:tailEnd type="triangle"/>
+          </a:ln>
+        </p:spPr>
+        <p:style>
+          <a:lnRef idx="1">
+            <a:schemeClr val="dk1"/>
+          </a:lnRef>
+          <a:fillRef idx="0">
+            <a:schemeClr val="dk1"/>
+          </a:fillRef>
+          <a:effectRef idx="0">
+            <a:schemeClr val="dk1"/>
+          </a:effectRef>
+          <a:fontRef idx="minor">
+            <a:schemeClr val="tx1"/>
+          </a:fontRef>
+        </p:style>
+      </p:cxnSp>
+      <p:cxnSp>
+        <p:nvCxnSpPr>
+          <p:cNvPr id="53" name="直接箭头连接符 52">
+            <a:extLst>
+              <a:ext uri="{FF2B5EF4-FFF2-40B4-BE49-F238E27FC236}">
+                <a16:creationId xmlns:a16="http://schemas.microsoft.com/office/drawing/2014/main" id="{FDDE6F63-42D1-6C8B-D03C-066EE014901F}"/>
+              </a:ext>
+            </a:extLst>
+          </p:cNvPr>
+          <p:cNvCxnSpPr>
+            <a:cxnSpLocks/>
+            <a:stCxn id="50" idx="3"/>
+            <a:endCxn id="51" idx="1"/>
+          </p:cNvCxnSpPr>
+          <p:nvPr/>
+        </p:nvCxnSpPr>
+        <p:spPr>
+          <a:xfrm>
+            <a:off x="3372322" y="2932138"/>
+            <a:ext cx="365303" cy="4771"/>
+          </a:xfrm>
+          <a:prstGeom prst="straightConnector1">
+            <a:avLst/>
+          </a:prstGeom>
+          <a:ln>
+            <a:tailEnd type="triangle"/>
+          </a:ln>
+        </p:spPr>
+        <p:style>
+          <a:lnRef idx="1">
+            <a:schemeClr val="dk1"/>
+          </a:lnRef>
+          <a:fillRef idx="0">
+            <a:schemeClr val="dk1"/>
+          </a:fillRef>
+          <a:effectRef idx="0">
+            <a:schemeClr val="dk1"/>
+          </a:effectRef>
+          <a:fontRef idx="minor">
+            <a:schemeClr val="tx1"/>
+          </a:fontRef>
+        </p:style>
+      </p:cxnSp>
+      <p:sp>
+        <p:nvSpPr>
+          <p:cNvPr id="54" name="Rectangles 4">
+            <a:extLst>
+              <a:ext uri="{FF2B5EF4-FFF2-40B4-BE49-F238E27FC236}">
+                <a16:creationId xmlns:a16="http://schemas.microsoft.com/office/drawing/2014/main" id="{C7F4F38A-16CF-EC45-DA73-E8528FD51638}"/>
+              </a:ext>
+            </a:extLst>
+          </p:cNvPr>
+          <p:cNvSpPr/>
+          <p:nvPr/>
+        </p:nvSpPr>
+        <p:spPr>
+          <a:xfrm>
+            <a:off x="4459798" y="2744495"/>
+            <a:ext cx="356870" cy="375285"/>
+          </a:xfrm>
+          <a:prstGeom prst="rect">
+            <a:avLst/>
+          </a:prstGeom>
+          <a:solidFill>
+            <a:schemeClr val="accent6">
+              <a:lumMod val="60000"/>
+              <a:lumOff val="40000"/>
+            </a:schemeClr>
+          </a:solidFill>
+          <a:ln w="19050">
+            <a:solidFill>
+              <a:schemeClr val="tx1">
+                <a:lumMod val="65000"/>
+                <a:lumOff val="35000"/>
+              </a:schemeClr>
+            </a:solidFill>
+          </a:ln>
+        </p:spPr>
+        <p:style>
+          <a:lnRef idx="2">
+            <a:schemeClr val="accent1">
+              <a:lumMod val="75000"/>
+            </a:schemeClr>
+          </a:lnRef>
+          <a:fillRef idx="1">
+            <a:schemeClr val="accent1"/>
+          </a:fillRef>
+          <a:effectRef idx="0">
+            <a:srgbClr val="FFFFFF"/>
+          </a:effectRef>
+          <a:fontRef idx="minor">
+            <a:schemeClr val="lt1"/>
+          </a:fontRef>
+        </p:style>
+        <p:txBody>
+          <a:bodyPr rtlCol="0" anchor="ctr"/>
+          <a:lstStyle/>
+          <a:p>
+            <a:pPr algn="ctr"/>
+            <a:r>
+              <a:rPr lang="en-US" b="1" dirty="0">
+                <a:solidFill>
+                  <a:schemeClr val="tx1"/>
+                </a:solidFill>
+                <a:latin typeface="Calibri" panose="020F0502020204030204" charset="0"/>
+                <a:cs typeface="Calibri" panose="020F0502020204030204" charset="0"/>
+              </a:rPr>
+              <a:t>5</a:t>
+            </a:r>
+          </a:p>
+        </p:txBody>
+      </p:sp>
+      <p:cxnSp>
+        <p:nvCxnSpPr>
+          <p:cNvPr id="55" name="直接箭头连接符 54">
+            <a:extLst>
+              <a:ext uri="{FF2B5EF4-FFF2-40B4-BE49-F238E27FC236}">
+                <a16:creationId xmlns:a16="http://schemas.microsoft.com/office/drawing/2014/main" id="{947D6291-81E5-C9D0-13BF-103D16327B8E}"/>
+              </a:ext>
+            </a:extLst>
+          </p:cNvPr>
+          <p:cNvCxnSpPr>
+            <a:cxnSpLocks/>
+            <a:stCxn id="51" idx="3"/>
+            <a:endCxn id="54" idx="1"/>
+          </p:cNvCxnSpPr>
+          <p:nvPr/>
+        </p:nvCxnSpPr>
+        <p:spPr>
+          <a:xfrm flipV="1">
+            <a:off x="4094495" y="2932138"/>
+            <a:ext cx="365303" cy="4771"/>
+          </a:xfrm>
+          <a:prstGeom prst="straightConnector1">
+            <a:avLst/>
+          </a:prstGeom>
+          <a:ln>
+            <a:tailEnd type="triangle"/>
+          </a:ln>
+        </p:spPr>
+        <p:style>
+          <a:lnRef idx="1">
+            <a:schemeClr val="dk1"/>
+          </a:lnRef>
+          <a:fillRef idx="0">
+            <a:schemeClr val="dk1"/>
+          </a:fillRef>
+          <a:effectRef idx="0">
+            <a:schemeClr val="dk1"/>
+          </a:effectRef>
+          <a:fontRef idx="minor">
+            <a:schemeClr val="tx1"/>
+          </a:fontRef>
+        </p:style>
+      </p:cxnSp>
+      <p:sp>
+        <p:nvSpPr>
+          <p:cNvPr id="56" name="Rectangles 4">
+            <a:extLst>
+              <a:ext uri="{FF2B5EF4-FFF2-40B4-BE49-F238E27FC236}">
+                <a16:creationId xmlns:a16="http://schemas.microsoft.com/office/drawing/2014/main" id="{2128B62C-5439-A5BF-04A4-0B296730E211}"/>
+              </a:ext>
+            </a:extLst>
+          </p:cNvPr>
+          <p:cNvSpPr/>
+          <p:nvPr/>
+        </p:nvSpPr>
+        <p:spPr>
+          <a:xfrm>
+            <a:off x="1579538" y="3413458"/>
+            <a:ext cx="1867669" cy="375285"/>
+          </a:xfrm>
+          <a:prstGeom prst="rect">
+            <a:avLst/>
+          </a:prstGeom>
+          <a:solidFill>
+            <a:schemeClr val="bg1"/>
+          </a:solidFill>
+          <a:ln w="19050">
+            <a:solidFill>
+              <a:schemeClr val="tx1">
+                <a:lumMod val="65000"/>
+                <a:lumOff val="35000"/>
+              </a:schemeClr>
+            </a:solidFill>
+          </a:ln>
+        </p:spPr>
+        <p:style>
+          <a:lnRef idx="2">
+            <a:schemeClr val="accent1">
+              <a:lumMod val="75000"/>
+            </a:schemeClr>
+          </a:lnRef>
+          <a:fillRef idx="1">
+            <a:schemeClr val="accent1"/>
+          </a:fillRef>
+          <a:effectRef idx="0">
+            <a:srgbClr val="FFFFFF"/>
+          </a:effectRef>
+          <a:fontRef idx="minor">
+            <a:schemeClr val="lt1"/>
+          </a:fontRef>
+        </p:style>
+        <p:txBody>
+          <a:bodyPr rtlCol="0" anchor="ctr"/>
+          <a:lstStyle/>
+          <a:p>
+            <a:pPr algn="ctr"/>
+            <a:endParaRPr lang="en-US" b="1" dirty="0">
+              <a:solidFill>
+                <a:schemeClr val="tx1"/>
+              </a:solidFill>
+              <a:latin typeface="Calibri" panose="020F0502020204030204" charset="0"/>
+              <a:cs typeface="Calibri" panose="020F0502020204030204" charset="0"/>
+            </a:endParaRPr>
+          </a:p>
+        </p:txBody>
+      </p:sp>
+      <p:sp>
+        <p:nvSpPr>
+          <p:cNvPr id="59" name="Rectangles 4">
+            <a:extLst>
+              <a:ext uri="{FF2B5EF4-FFF2-40B4-BE49-F238E27FC236}">
+                <a16:creationId xmlns:a16="http://schemas.microsoft.com/office/drawing/2014/main" id="{3D7FAAB9-74E9-3948-A9D9-2DEE10EC30C1}"/>
+              </a:ext>
+            </a:extLst>
+          </p:cNvPr>
+          <p:cNvSpPr/>
+          <p:nvPr/>
+        </p:nvSpPr>
+        <p:spPr>
+          <a:xfrm>
+            <a:off x="2661769" y="4063657"/>
+            <a:ext cx="356870" cy="375285"/>
+          </a:xfrm>
+          <a:prstGeom prst="rect">
+            <a:avLst/>
+          </a:prstGeom>
+          <a:solidFill>
+            <a:schemeClr val="bg1"/>
+          </a:solidFill>
+          <a:ln w="19050">
+            <a:solidFill>
+              <a:schemeClr val="tx1">
+                <a:lumMod val="65000"/>
+                <a:lumOff val="35000"/>
+              </a:schemeClr>
+            </a:solidFill>
+          </a:ln>
+        </p:spPr>
+        <p:style>
+          <a:lnRef idx="2">
+            <a:schemeClr val="accent1">
+              <a:lumMod val="75000"/>
+            </a:schemeClr>
+          </a:lnRef>
+          <a:fillRef idx="1">
+            <a:schemeClr val="accent1"/>
+          </a:fillRef>
+          <a:effectRef idx="0">
+            <a:srgbClr val="FFFFFF"/>
+          </a:effectRef>
+          <a:fontRef idx="minor">
+            <a:schemeClr val="lt1"/>
+          </a:fontRef>
+        </p:style>
+        <p:txBody>
+          <a:bodyPr rtlCol="0" anchor="ctr"/>
+          <a:lstStyle/>
+          <a:p>
+            <a:pPr algn="ctr"/>
+            <a:r>
+              <a:rPr lang="en-US" b="1" dirty="0">
+                <a:solidFill>
+                  <a:schemeClr val="tx1"/>
+                </a:solidFill>
+                <a:latin typeface="Calibri" panose="020F0502020204030204" charset="0"/>
+                <a:cs typeface="Calibri" panose="020F0502020204030204" charset="0"/>
+              </a:rPr>
+              <a:t>2</a:t>
+            </a:r>
+          </a:p>
+        </p:txBody>
+      </p:sp>
+      <p:sp>
+        <p:nvSpPr>
+          <p:cNvPr id="60" name="Rectangles 4">
+            <a:extLst>
+              <a:ext uri="{FF2B5EF4-FFF2-40B4-BE49-F238E27FC236}">
+                <a16:creationId xmlns:a16="http://schemas.microsoft.com/office/drawing/2014/main" id="{FCAE11B4-D42F-268E-CEB2-BE9668A1E569}"/>
+              </a:ext>
+            </a:extLst>
+          </p:cNvPr>
+          <p:cNvSpPr/>
+          <p:nvPr/>
+        </p:nvSpPr>
+        <p:spPr>
+          <a:xfrm>
+            <a:off x="3375510" y="4063657"/>
+            <a:ext cx="356870" cy="375285"/>
+          </a:xfrm>
+          <a:prstGeom prst="rect">
+            <a:avLst/>
+          </a:prstGeom>
+          <a:solidFill>
+            <a:schemeClr val="bg1"/>
+          </a:solidFill>
+          <a:ln w="19050">
+            <a:solidFill>
+              <a:schemeClr val="tx1">
+                <a:lumMod val="65000"/>
+                <a:lumOff val="35000"/>
+              </a:schemeClr>
+            </a:solidFill>
+          </a:ln>
+        </p:spPr>
+        <p:style>
+          <a:lnRef idx="2">
+            <a:schemeClr val="accent1">
+              <a:lumMod val="75000"/>
+            </a:schemeClr>
+          </a:lnRef>
+          <a:fillRef idx="1">
+            <a:schemeClr val="accent1"/>
+          </a:fillRef>
+          <a:effectRef idx="0">
+            <a:srgbClr val="FFFFFF"/>
+          </a:effectRef>
+          <a:fontRef idx="minor">
+            <a:schemeClr val="lt1"/>
+          </a:fontRef>
+        </p:style>
+        <p:txBody>
+          <a:bodyPr rtlCol="0" anchor="ctr"/>
+          <a:lstStyle/>
+          <a:p>
+            <a:pPr algn="ctr"/>
+            <a:r>
+              <a:rPr lang="en-US" b="1" dirty="0">
+                <a:solidFill>
+                  <a:schemeClr val="tx1"/>
+                </a:solidFill>
+                <a:latin typeface="Calibri" panose="020F0502020204030204" charset="0"/>
+                <a:cs typeface="Calibri" panose="020F0502020204030204" charset="0"/>
+              </a:rPr>
+              <a:t>1</a:t>
+            </a:r>
+          </a:p>
+        </p:txBody>
+      </p:sp>
+      <p:cxnSp>
+        <p:nvCxnSpPr>
+          <p:cNvPr id="61" name="直接箭头连接符 60">
+            <a:extLst>
+              <a:ext uri="{FF2B5EF4-FFF2-40B4-BE49-F238E27FC236}">
+                <a16:creationId xmlns:a16="http://schemas.microsoft.com/office/drawing/2014/main" id="{56D8EBF0-C5B4-D76D-F91F-62FBF2C9B34E}"/>
+              </a:ext>
+            </a:extLst>
+          </p:cNvPr>
+          <p:cNvCxnSpPr>
+            <a:cxnSpLocks/>
+            <a:stCxn id="59" idx="3"/>
+            <a:endCxn id="60" idx="1"/>
+          </p:cNvCxnSpPr>
+          <p:nvPr/>
+        </p:nvCxnSpPr>
+        <p:spPr>
+          <a:xfrm>
+            <a:off x="3018639" y="4251300"/>
+            <a:ext cx="356871" cy="0"/>
+          </a:xfrm>
+          <a:prstGeom prst="straightConnector1">
+            <a:avLst/>
+          </a:prstGeom>
+          <a:ln>
+            <a:tailEnd type="triangle"/>
+          </a:ln>
+        </p:spPr>
+        <p:style>
+          <a:lnRef idx="1">
+            <a:schemeClr val="dk1"/>
+          </a:lnRef>
+          <a:fillRef idx="0">
+            <a:schemeClr val="dk1"/>
+          </a:fillRef>
+          <a:effectRef idx="0">
+            <a:schemeClr val="dk1"/>
+          </a:effectRef>
+          <a:fontRef idx="minor">
+            <a:schemeClr val="tx1"/>
+          </a:fontRef>
+        </p:style>
+      </p:cxnSp>
+      <p:sp>
+        <p:nvSpPr>
+          <p:cNvPr id="63" name="Rectangles 4">
+            <a:extLst>
+              <a:ext uri="{FF2B5EF4-FFF2-40B4-BE49-F238E27FC236}">
+                <a16:creationId xmlns:a16="http://schemas.microsoft.com/office/drawing/2014/main" id="{DEF774DC-1BAA-9436-8253-DF1A87CB43D7}"/>
+              </a:ext>
+            </a:extLst>
+          </p:cNvPr>
+          <p:cNvSpPr/>
+          <p:nvPr/>
+        </p:nvSpPr>
+        <p:spPr>
+          <a:xfrm>
+            <a:off x="4089251" y="4063657"/>
+            <a:ext cx="356870" cy="375285"/>
+          </a:xfrm>
+          <a:prstGeom prst="rect">
+            <a:avLst/>
+          </a:prstGeom>
+          <a:solidFill>
+            <a:schemeClr val="bg1"/>
+          </a:solidFill>
+          <a:ln w="19050">
+            <a:solidFill>
+              <a:schemeClr val="tx1">
+                <a:lumMod val="65000"/>
+                <a:lumOff val="35000"/>
+              </a:schemeClr>
+            </a:solidFill>
+          </a:ln>
+        </p:spPr>
+        <p:style>
+          <a:lnRef idx="2">
+            <a:schemeClr val="accent1">
+              <a:lumMod val="75000"/>
+            </a:schemeClr>
+          </a:lnRef>
+          <a:fillRef idx="1">
+            <a:schemeClr val="accent1"/>
+          </a:fillRef>
+          <a:effectRef idx="0">
+            <a:srgbClr val="FFFFFF"/>
+          </a:effectRef>
+          <a:fontRef idx="minor">
+            <a:schemeClr val="lt1"/>
+          </a:fontRef>
+        </p:style>
+        <p:txBody>
+          <a:bodyPr rtlCol="0" anchor="ctr"/>
+          <a:lstStyle/>
+          <a:p>
+            <a:pPr algn="ctr"/>
+            <a:r>
+              <a:rPr lang="en-US" b="1" dirty="0">
+                <a:solidFill>
+                  <a:schemeClr val="tx1"/>
+                </a:solidFill>
+                <a:latin typeface="Calibri" panose="020F0502020204030204" charset="0"/>
+                <a:cs typeface="Calibri" panose="020F0502020204030204" charset="0"/>
+              </a:rPr>
+              <a:t>3</a:t>
+            </a:r>
+          </a:p>
+        </p:txBody>
+      </p:sp>
+      <p:sp>
+        <p:nvSpPr>
+          <p:cNvPr id="192" name="Rectangles 4">
+            <a:extLst>
+              <a:ext uri="{FF2B5EF4-FFF2-40B4-BE49-F238E27FC236}">
+                <a16:creationId xmlns:a16="http://schemas.microsoft.com/office/drawing/2014/main" id="{243A6CBF-1F4F-7118-9630-DBDD67626292}"/>
+              </a:ext>
+            </a:extLst>
+          </p:cNvPr>
+          <p:cNvSpPr/>
+          <p:nvPr/>
+        </p:nvSpPr>
+        <p:spPr>
+          <a:xfrm>
+            <a:off x="4819856" y="4076204"/>
+            <a:ext cx="356870" cy="362738"/>
+          </a:xfrm>
+          <a:prstGeom prst="rect">
+            <a:avLst/>
+          </a:prstGeom>
+          <a:solidFill>
+            <a:schemeClr val="bg1"/>
+          </a:solidFill>
+          <a:ln w="19050">
+            <a:solidFill>
+              <a:schemeClr val="tx1">
+                <a:lumMod val="65000"/>
+                <a:lumOff val="35000"/>
+              </a:schemeClr>
+            </a:solidFill>
+          </a:ln>
+        </p:spPr>
+        <p:style>
+          <a:lnRef idx="2">
+            <a:schemeClr val="accent1">
+              <a:lumMod val="75000"/>
+            </a:schemeClr>
+          </a:lnRef>
+          <a:fillRef idx="1">
+            <a:schemeClr val="accent1"/>
+          </a:fillRef>
+          <a:effectRef idx="0">
+            <a:srgbClr val="FFFFFF"/>
+          </a:effectRef>
+          <a:fontRef idx="minor">
+            <a:schemeClr val="lt1"/>
+          </a:fontRef>
+        </p:style>
+        <p:txBody>
+          <a:bodyPr rtlCol="0" anchor="ctr"/>
+          <a:lstStyle/>
+          <a:p>
+            <a:pPr algn="ctr"/>
+            <a:r>
+              <a:rPr lang="en-US" b="1" dirty="0">
+                <a:solidFill>
+                  <a:schemeClr val="tx1"/>
+                </a:solidFill>
+                <a:latin typeface="Calibri" panose="020F0502020204030204" charset="0"/>
+                <a:cs typeface="Calibri" panose="020F0502020204030204" charset="0"/>
+              </a:rPr>
+              <a:t>4</a:t>
+            </a:r>
+          </a:p>
+        </p:txBody>
+      </p:sp>
+      <p:cxnSp>
+        <p:nvCxnSpPr>
+          <p:cNvPr id="193" name="直接箭头连接符 192">
+            <a:extLst>
+              <a:ext uri="{FF2B5EF4-FFF2-40B4-BE49-F238E27FC236}">
+                <a16:creationId xmlns:a16="http://schemas.microsoft.com/office/drawing/2014/main" id="{B5311B02-6148-BFB5-333F-59C90167424F}"/>
+              </a:ext>
+            </a:extLst>
+          </p:cNvPr>
+          <p:cNvCxnSpPr>
+            <a:cxnSpLocks/>
+            <a:stCxn id="60" idx="3"/>
+            <a:endCxn id="63" idx="1"/>
+          </p:cNvCxnSpPr>
+          <p:nvPr/>
+        </p:nvCxnSpPr>
+        <p:spPr>
+          <a:xfrm>
+            <a:off x="3732380" y="4251300"/>
+            <a:ext cx="356871" cy="0"/>
+          </a:xfrm>
+          <a:prstGeom prst="straightConnector1">
+            <a:avLst/>
+          </a:prstGeom>
+          <a:ln>
+            <a:tailEnd type="triangle"/>
+          </a:ln>
+        </p:spPr>
+        <p:style>
+          <a:lnRef idx="1">
+            <a:schemeClr val="dk1"/>
+          </a:lnRef>
+          <a:fillRef idx="0">
+            <a:schemeClr val="dk1"/>
+          </a:fillRef>
+          <a:effectRef idx="0">
+            <a:schemeClr val="dk1"/>
+          </a:effectRef>
+          <a:fontRef idx="minor">
+            <a:schemeClr val="tx1"/>
+          </a:fontRef>
+        </p:style>
+      </p:cxnSp>
+      <p:cxnSp>
+        <p:nvCxnSpPr>
+          <p:cNvPr id="196" name="直接箭头连接符 195">
+            <a:extLst>
+              <a:ext uri="{FF2B5EF4-FFF2-40B4-BE49-F238E27FC236}">
+                <a16:creationId xmlns:a16="http://schemas.microsoft.com/office/drawing/2014/main" id="{DF495D83-F856-2902-4209-45A89D44BF1F}"/>
+              </a:ext>
+            </a:extLst>
+          </p:cNvPr>
+          <p:cNvCxnSpPr>
+            <a:cxnSpLocks/>
+            <a:stCxn id="63" idx="3"/>
+            <a:endCxn id="192" idx="1"/>
+          </p:cNvCxnSpPr>
+          <p:nvPr/>
+        </p:nvCxnSpPr>
+        <p:spPr>
+          <a:xfrm>
+            <a:off x="4446121" y="4251300"/>
+            <a:ext cx="373735" cy="6273"/>
+          </a:xfrm>
+          <a:prstGeom prst="straightConnector1">
+            <a:avLst/>
+          </a:prstGeom>
+          <a:ln>
+            <a:tailEnd type="triangle"/>
+          </a:ln>
+        </p:spPr>
+        <p:style>
+          <a:lnRef idx="1">
+            <a:schemeClr val="dk1"/>
+          </a:lnRef>
+          <a:fillRef idx="0">
+            <a:schemeClr val="dk1"/>
+          </a:fillRef>
+          <a:effectRef idx="0">
+            <a:schemeClr val="dk1"/>
+          </a:effectRef>
+          <a:fontRef idx="minor">
+            <a:schemeClr val="tx1"/>
+          </a:fontRef>
+        </p:style>
+      </p:cxnSp>
+      <p:sp>
+        <p:nvSpPr>
+          <p:cNvPr id="199" name="文本框 198">
+            <a:extLst>
+              <a:ext uri="{FF2B5EF4-FFF2-40B4-BE49-F238E27FC236}">
+                <a16:creationId xmlns:a16="http://schemas.microsoft.com/office/drawing/2014/main" id="{E2005B70-BD08-7434-5084-45F46AEF26B8}"/>
+              </a:ext>
+            </a:extLst>
+          </p:cNvPr>
+          <p:cNvSpPr txBox="1"/>
+          <p:nvPr/>
+        </p:nvSpPr>
+        <p:spPr>
+          <a:xfrm>
+            <a:off x="1444766" y="2051709"/>
+            <a:ext cx="1124219" cy="369332"/>
+          </a:xfrm>
+          <a:prstGeom prst="rect">
+            <a:avLst/>
+          </a:prstGeom>
+          <a:noFill/>
+        </p:spPr>
+        <p:txBody>
+          <a:bodyPr wrap="none" rtlCol="0">
+            <a:spAutoFit/>
+          </a:bodyPr>
+          <a:lstStyle/>
+          <a:p>
+            <a:r>
+              <a:rPr lang="en-US" altLang="zh-CN" b="1" dirty="0">
+                <a:solidFill>
+                  <a:srgbClr val="CF747A"/>
+                </a:solidFill>
+              </a:rPr>
+              <a:t>Swapped:</a:t>
+            </a:r>
+            <a:endParaRPr lang="zh-CN" altLang="en-US" b="1" dirty="0">
+              <a:solidFill>
+                <a:srgbClr val="CF747A"/>
+              </a:solidFill>
+            </a:endParaRPr>
+          </a:p>
+        </p:txBody>
+      </p:sp>
+      <p:sp>
+        <p:nvSpPr>
+          <p:cNvPr id="200" name="文本框 199">
+            <a:extLst>
+              <a:ext uri="{FF2B5EF4-FFF2-40B4-BE49-F238E27FC236}">
+                <a16:creationId xmlns:a16="http://schemas.microsoft.com/office/drawing/2014/main" id="{C7F76466-8579-419B-806F-7D5AEE03E23B}"/>
+              </a:ext>
+            </a:extLst>
+          </p:cNvPr>
+          <p:cNvSpPr txBox="1"/>
+          <p:nvPr/>
+        </p:nvSpPr>
+        <p:spPr>
+          <a:xfrm>
+            <a:off x="1470573" y="4026631"/>
+            <a:ext cx="1124219" cy="369332"/>
+          </a:xfrm>
+          <a:prstGeom prst="rect">
+            <a:avLst/>
+          </a:prstGeom>
+          <a:noFill/>
+        </p:spPr>
+        <p:txBody>
+          <a:bodyPr wrap="none" rtlCol="0">
+            <a:spAutoFit/>
+          </a:bodyPr>
+          <a:lstStyle/>
+          <a:p>
+            <a:r>
+              <a:rPr lang="en-US" altLang="zh-CN" b="1" dirty="0">
+                <a:solidFill>
+                  <a:srgbClr val="CF747A"/>
+                </a:solidFill>
+              </a:rPr>
+              <a:t>Swapped:</a:t>
+            </a:r>
+            <a:endParaRPr lang="zh-CN" altLang="en-US" b="1" dirty="0">
+              <a:solidFill>
+                <a:srgbClr val="CF747A"/>
+              </a:solidFill>
+            </a:endParaRPr>
+          </a:p>
+        </p:txBody>
+      </p:sp>
+      <p:cxnSp>
+        <p:nvCxnSpPr>
+          <p:cNvPr id="216" name="连接符: 肘形 215">
+            <a:extLst>
+              <a:ext uri="{FF2B5EF4-FFF2-40B4-BE49-F238E27FC236}">
+                <a16:creationId xmlns:a16="http://schemas.microsoft.com/office/drawing/2014/main" id="{2EEFDACC-B3E8-094D-EB37-1C6C06C881C3}"/>
+              </a:ext>
+            </a:extLst>
+          </p:cNvPr>
+          <p:cNvCxnSpPr>
+            <a:cxnSpLocks/>
+            <a:stCxn id="7" idx="2"/>
+          </p:cNvCxnSpPr>
+          <p:nvPr/>
+        </p:nvCxnSpPr>
+        <p:spPr>
+          <a:xfrm rot="5400000">
+            <a:off x="4893563" y="-417620"/>
+            <a:ext cx="366350" cy="3259059"/>
+          </a:xfrm>
+          <a:prstGeom prst="bentConnector2">
+            <a:avLst/>
+          </a:prstGeom>
+          <a:ln>
+            <a:tailEnd type="triangle"/>
+          </a:ln>
+        </p:spPr>
+        <p:style>
+          <a:lnRef idx="1">
+            <a:schemeClr val="dk1"/>
+          </a:lnRef>
+          <a:fillRef idx="0">
+            <a:schemeClr val="dk1"/>
+          </a:fillRef>
+          <a:effectRef idx="0">
+            <a:schemeClr val="dk1"/>
+          </a:effectRef>
+          <a:fontRef idx="minor">
+            <a:schemeClr val="tx1"/>
+          </a:fontRef>
+        </p:style>
+      </p:cxnSp>
+      <p:cxnSp>
+        <p:nvCxnSpPr>
+          <p:cNvPr id="227" name="连接符: 肘形 226">
+            <a:extLst>
+              <a:ext uri="{FF2B5EF4-FFF2-40B4-BE49-F238E27FC236}">
+                <a16:creationId xmlns:a16="http://schemas.microsoft.com/office/drawing/2014/main" id="{3869E483-A3A0-C5B7-48C2-8AEC377DAB94}"/>
+              </a:ext>
+            </a:extLst>
+          </p:cNvPr>
+          <p:cNvCxnSpPr>
+            <a:cxnSpLocks/>
+            <a:endCxn id="42" idx="3"/>
+          </p:cNvCxnSpPr>
+          <p:nvPr/>
+        </p:nvCxnSpPr>
+        <p:spPr>
+          <a:xfrm rot="16200000" flipH="1">
+            <a:off x="3287302" y="1741755"/>
+            <a:ext cx="601796" cy="281986"/>
+          </a:xfrm>
+          <a:prstGeom prst="bentConnector4">
+            <a:avLst>
+              <a:gd name="adj1" fmla="val 6530"/>
+              <a:gd name="adj2" fmla="val 573764"/>
+            </a:avLst>
+          </a:prstGeom>
+          <a:ln>
+            <a:tailEnd type="triangle"/>
+          </a:ln>
+        </p:spPr>
+        <p:style>
+          <a:lnRef idx="1">
+            <a:schemeClr val="dk1"/>
+          </a:lnRef>
+          <a:fillRef idx="0">
+            <a:schemeClr val="dk1"/>
+          </a:fillRef>
+          <a:effectRef idx="0">
+            <a:schemeClr val="dk1"/>
+          </a:effectRef>
+          <a:fontRef idx="minor">
+            <a:schemeClr val="tx1"/>
+          </a:fontRef>
+        </p:style>
+      </p:cxnSp>
+      <p:sp>
+        <p:nvSpPr>
+          <p:cNvPr id="239" name="文本框 238">
+            <a:extLst>
+              <a:ext uri="{FF2B5EF4-FFF2-40B4-BE49-F238E27FC236}">
+                <a16:creationId xmlns:a16="http://schemas.microsoft.com/office/drawing/2014/main" id="{9D29AF35-1BAA-3D29-BD20-6AC0C7F05D8C}"/>
+              </a:ext>
+            </a:extLst>
+          </p:cNvPr>
+          <p:cNvSpPr txBox="1"/>
+          <p:nvPr/>
+        </p:nvSpPr>
+        <p:spPr>
+          <a:xfrm>
+            <a:off x="5165598" y="1744512"/>
+            <a:ext cx="4311052" cy="369332"/>
+          </a:xfrm>
+          <a:prstGeom prst="rect">
+            <a:avLst/>
+          </a:prstGeom>
+          <a:noFill/>
+        </p:spPr>
+        <p:txBody>
+          <a:bodyPr wrap="none" rtlCol="0">
+            <a:spAutoFit/>
+          </a:bodyPr>
+          <a:lstStyle/>
+          <a:p>
+            <a:r>
+              <a:rPr lang="en-US" altLang="zh-CN" b="1" dirty="0"/>
+              <a:t>Pop </a:t>
+            </a:r>
+            <a:r>
+              <a:rPr lang="en-US" altLang="zh-CN" dirty="0"/>
+              <a:t>up all nodes, because (</a:t>
+            </a:r>
+            <a:r>
+              <a:rPr lang="en-US" altLang="zh-CN" dirty="0" err="1"/>
+              <a:t>stack.size</a:t>
+            </a:r>
+            <a:r>
+              <a:rPr lang="en-US" altLang="zh-CN" dirty="0"/>
+              <a:t> == 2 )</a:t>
+            </a:r>
+            <a:endParaRPr lang="zh-CN" altLang="en-US" dirty="0"/>
+          </a:p>
+        </p:txBody>
+      </p:sp>
+      <p:sp>
+        <p:nvSpPr>
+          <p:cNvPr id="253" name="文本框 252">
+            <a:extLst>
+              <a:ext uri="{FF2B5EF4-FFF2-40B4-BE49-F238E27FC236}">
+                <a16:creationId xmlns:a16="http://schemas.microsoft.com/office/drawing/2014/main" id="{4AB9DDD0-309C-6123-A2B4-5258AFEE31F5}"/>
+              </a:ext>
+            </a:extLst>
+          </p:cNvPr>
+          <p:cNvSpPr txBox="1"/>
+          <p:nvPr/>
+        </p:nvSpPr>
+        <p:spPr>
+          <a:xfrm>
+            <a:off x="6096000" y="3898769"/>
+            <a:ext cx="3267626" cy="369332"/>
+          </a:xfrm>
+          <a:prstGeom prst="rect">
+            <a:avLst/>
+          </a:prstGeom>
+          <a:noFill/>
+        </p:spPr>
+        <p:txBody>
+          <a:bodyPr wrap="none" rtlCol="0">
+            <a:spAutoFit/>
+          </a:bodyPr>
+          <a:lstStyle/>
+          <a:p>
+            <a:r>
+              <a:rPr lang="en-US" altLang="zh-CN" dirty="0"/>
+              <a:t>Last node is added directly to res</a:t>
+            </a:r>
+            <a:endParaRPr lang="zh-CN" altLang="en-US" dirty="0"/>
+          </a:p>
+        </p:txBody>
+      </p:sp>
+      <p:cxnSp>
+        <p:nvCxnSpPr>
+          <p:cNvPr id="263" name="连接符: 肘形 262">
+            <a:extLst>
+              <a:ext uri="{FF2B5EF4-FFF2-40B4-BE49-F238E27FC236}">
+                <a16:creationId xmlns:a16="http://schemas.microsoft.com/office/drawing/2014/main" id="{83048D17-DF4A-A05F-DE67-F6CFDD53C6B0}"/>
+              </a:ext>
+            </a:extLst>
+          </p:cNvPr>
+          <p:cNvCxnSpPr>
+            <a:cxnSpLocks/>
+            <a:stCxn id="192" idx="3"/>
+            <a:endCxn id="266" idx="2"/>
+          </p:cNvCxnSpPr>
+          <p:nvPr/>
+        </p:nvCxnSpPr>
+        <p:spPr>
+          <a:xfrm flipV="1">
+            <a:off x="5176726" y="3788742"/>
+            <a:ext cx="740839" cy="468831"/>
+          </a:xfrm>
+          <a:prstGeom prst="bentConnector2">
+            <a:avLst/>
+          </a:prstGeom>
+          <a:ln>
+            <a:tailEnd type="triangle"/>
+          </a:ln>
+        </p:spPr>
+        <p:style>
+          <a:lnRef idx="1">
+            <a:schemeClr val="dk1"/>
+          </a:lnRef>
+          <a:fillRef idx="0">
+            <a:schemeClr val="dk1"/>
+          </a:fillRef>
+          <a:effectRef idx="0">
+            <a:schemeClr val="dk1"/>
+          </a:effectRef>
+          <a:fontRef idx="minor">
+            <a:schemeClr val="tx1"/>
+          </a:fontRef>
+        </p:style>
+      </p:cxnSp>
+      <p:sp>
+        <p:nvSpPr>
+          <p:cNvPr id="266" name="Rectangles 4">
+            <a:extLst>
+              <a:ext uri="{FF2B5EF4-FFF2-40B4-BE49-F238E27FC236}">
+                <a16:creationId xmlns:a16="http://schemas.microsoft.com/office/drawing/2014/main" id="{8F44C171-D720-E7C3-E8BB-CA333B5DB4BA}"/>
+              </a:ext>
+            </a:extLst>
+          </p:cNvPr>
+          <p:cNvSpPr/>
+          <p:nvPr/>
+        </p:nvSpPr>
+        <p:spPr>
+          <a:xfrm>
+            <a:off x="5739130" y="3413457"/>
+            <a:ext cx="356870" cy="375285"/>
+          </a:xfrm>
+          <a:prstGeom prst="rect">
+            <a:avLst/>
+          </a:prstGeom>
+          <a:solidFill>
+            <a:schemeClr val="accent6">
+              <a:lumMod val="60000"/>
+              <a:lumOff val="40000"/>
+            </a:schemeClr>
+          </a:solidFill>
+          <a:ln w="19050">
+            <a:solidFill>
+              <a:schemeClr val="tx1">
+                <a:lumMod val="65000"/>
+                <a:lumOff val="35000"/>
+              </a:schemeClr>
+            </a:solidFill>
+          </a:ln>
+        </p:spPr>
+        <p:style>
+          <a:lnRef idx="2">
+            <a:schemeClr val="accent1">
+              <a:lumMod val="75000"/>
+            </a:schemeClr>
+          </a:lnRef>
+          <a:fillRef idx="1">
+            <a:schemeClr val="accent1"/>
+          </a:fillRef>
+          <a:effectRef idx="0">
+            <a:srgbClr val="FFFFFF"/>
+          </a:effectRef>
+          <a:fontRef idx="minor">
+            <a:schemeClr val="lt1"/>
+          </a:fontRef>
+        </p:style>
+        <p:txBody>
+          <a:bodyPr rtlCol="0" anchor="ctr"/>
+          <a:lstStyle/>
+          <a:p>
+            <a:pPr algn="ctr"/>
+            <a:r>
+              <a:rPr lang="en-US" b="1" dirty="0">
+                <a:solidFill>
+                  <a:schemeClr val="tx1"/>
+                </a:solidFill>
+                <a:latin typeface="Calibri" panose="020F0502020204030204" charset="0"/>
+                <a:cs typeface="Calibri" panose="020F0502020204030204" charset="0"/>
+              </a:rPr>
+              <a:t>5</a:t>
+            </a:r>
+          </a:p>
+        </p:txBody>
+      </p:sp>
+    </p:spTree>
+    <p:extLst>
+      <p:ext uri="{BB962C8B-B14F-4D97-AF65-F5344CB8AC3E}">
+        <p14:creationId xmlns:p14="http://schemas.microsoft.com/office/powerpoint/2010/main" val="510766477"/>
+      </p:ext>
+    </p:extLst>
   </p:cSld>
   <p:clrMapOvr>
     <a:masterClrMapping/>

</xml_diff>